<commit_message>
more added blank lectures
</commit_message>
<xml_diff>
--- a/docs/lectures/lecture_07/07_01_lecture_powerpoint.pptx
+++ b/docs/lectures/lecture_07/07_01_lecture_powerpoint.pptx
@@ -5761,6 +5761,13 @@
             <a:r>
               <a:rPr b="1"/>
               <a:t>Assumptions of parametric tests</a:t>
+            </a:r>
+          </a:p>
+          <a:p>
+            <a:pPr lvl="0"/>
+            <a:r>
+              <a:rPr/>
+              <a:t>What next</a:t>
             </a:r>
           </a:p>
         </p:txBody>

</xml_diff>